<commit_message>
update no diagrama e relatório done
</commit_message>
<xml_diff>
--- a/diagrama/diagrama_edit.pptx
+++ b/diagrama/diagrama_edit.pptx
@@ -259,7 +259,7 @@
           <a:p>
             <a:fld id="{D0D7FD28-DC97-44DB-B385-22B1ECCFA809}" type="datetimeFigureOut">
               <a:rPr lang="pt-PT" smtClean="0"/>
-              <a:t>01/04/2021</a:t>
+              <a:t>23/05/2021</a:t>
             </a:fld>
             <a:endParaRPr lang="pt-PT"/>
           </a:p>
@@ -457,7 +457,7 @@
           <a:p>
             <a:fld id="{D0D7FD28-DC97-44DB-B385-22B1ECCFA809}" type="datetimeFigureOut">
               <a:rPr lang="pt-PT" smtClean="0"/>
-              <a:t>01/04/2021</a:t>
+              <a:t>23/05/2021</a:t>
             </a:fld>
             <a:endParaRPr lang="pt-PT"/>
           </a:p>
@@ -665,7 +665,7 @@
           <a:p>
             <a:fld id="{D0D7FD28-DC97-44DB-B385-22B1ECCFA809}" type="datetimeFigureOut">
               <a:rPr lang="pt-PT" smtClean="0"/>
-              <a:t>01/04/2021</a:t>
+              <a:t>23/05/2021</a:t>
             </a:fld>
             <a:endParaRPr lang="pt-PT"/>
           </a:p>
@@ -863,7 +863,7 @@
           <a:p>
             <a:fld id="{D0D7FD28-DC97-44DB-B385-22B1ECCFA809}" type="datetimeFigureOut">
               <a:rPr lang="pt-PT" smtClean="0"/>
-              <a:t>01/04/2021</a:t>
+              <a:t>23/05/2021</a:t>
             </a:fld>
             <a:endParaRPr lang="pt-PT"/>
           </a:p>
@@ -1138,7 +1138,7 @@
           <a:p>
             <a:fld id="{D0D7FD28-DC97-44DB-B385-22B1ECCFA809}" type="datetimeFigureOut">
               <a:rPr lang="pt-PT" smtClean="0"/>
-              <a:t>01/04/2021</a:t>
+              <a:t>23/05/2021</a:t>
             </a:fld>
             <a:endParaRPr lang="pt-PT"/>
           </a:p>
@@ -1403,7 +1403,7 @@
           <a:p>
             <a:fld id="{D0D7FD28-DC97-44DB-B385-22B1ECCFA809}" type="datetimeFigureOut">
               <a:rPr lang="pt-PT" smtClean="0"/>
-              <a:t>01/04/2021</a:t>
+              <a:t>23/05/2021</a:t>
             </a:fld>
             <a:endParaRPr lang="pt-PT"/>
           </a:p>
@@ -1815,7 +1815,7 @@
           <a:p>
             <a:fld id="{D0D7FD28-DC97-44DB-B385-22B1ECCFA809}" type="datetimeFigureOut">
               <a:rPr lang="pt-PT" smtClean="0"/>
-              <a:t>01/04/2021</a:t>
+              <a:t>23/05/2021</a:t>
             </a:fld>
             <a:endParaRPr lang="pt-PT"/>
           </a:p>
@@ -1956,7 +1956,7 @@
           <a:p>
             <a:fld id="{D0D7FD28-DC97-44DB-B385-22B1ECCFA809}" type="datetimeFigureOut">
               <a:rPr lang="pt-PT" smtClean="0"/>
-              <a:t>01/04/2021</a:t>
+              <a:t>23/05/2021</a:t>
             </a:fld>
             <a:endParaRPr lang="pt-PT"/>
           </a:p>
@@ -2069,7 +2069,7 @@
           <a:p>
             <a:fld id="{D0D7FD28-DC97-44DB-B385-22B1ECCFA809}" type="datetimeFigureOut">
               <a:rPr lang="pt-PT" smtClean="0"/>
-              <a:t>01/04/2021</a:t>
+              <a:t>23/05/2021</a:t>
             </a:fld>
             <a:endParaRPr lang="pt-PT"/>
           </a:p>
@@ -2380,7 +2380,7 @@
           <a:p>
             <a:fld id="{D0D7FD28-DC97-44DB-B385-22B1ECCFA809}" type="datetimeFigureOut">
               <a:rPr lang="pt-PT" smtClean="0"/>
-              <a:t>01/04/2021</a:t>
+              <a:t>23/05/2021</a:t>
             </a:fld>
             <a:endParaRPr lang="pt-PT"/>
           </a:p>
@@ -2668,7 +2668,7 @@
           <a:p>
             <a:fld id="{D0D7FD28-DC97-44DB-B385-22B1ECCFA809}" type="datetimeFigureOut">
               <a:rPr lang="pt-PT" smtClean="0"/>
-              <a:t>01/04/2021</a:t>
+              <a:t>23/05/2021</a:t>
             </a:fld>
             <a:endParaRPr lang="pt-PT"/>
           </a:p>
@@ -2909,7 +2909,7 @@
           <a:p>
             <a:fld id="{D0D7FD28-DC97-44DB-B385-22B1ECCFA809}" type="datetimeFigureOut">
               <a:rPr lang="pt-PT" smtClean="0"/>
-              <a:t>01/04/2021</a:t>
+              <a:t>23/05/2021</a:t>
             </a:fld>
             <a:endParaRPr lang="pt-PT"/>
           </a:p>
@@ -4512,7 +4512,7 @@
             <a:pPr algn="ctr"/>
             <a:r>
               <a:rPr lang="pt-PT" sz="1400" dirty="0" err="1"/>
-              <a:t>Unnammed</a:t>
+              <a:t>Unnamed</a:t>
             </a:r>
             <a:r>
               <a:rPr lang="pt-PT" sz="1400" dirty="0"/>
@@ -4601,7 +4601,7 @@
             <a:pPr algn="ctr"/>
             <a:r>
               <a:rPr lang="pt-PT" sz="1400" dirty="0" err="1"/>
-              <a:t>Unnammed</a:t>
+              <a:t>Unnamed</a:t>
             </a:r>
             <a:r>
               <a:rPr lang="pt-PT" sz="1400" dirty="0"/>
@@ -4690,7 +4690,7 @@
             <a:pPr algn="ctr"/>
             <a:r>
               <a:rPr lang="pt-PT" sz="1400" dirty="0" err="1"/>
-              <a:t>Unnammed</a:t>
+              <a:t>Unnamed</a:t>
             </a:r>
             <a:r>
               <a:rPr lang="pt-PT" sz="1400" dirty="0"/>
@@ -5917,6 +5917,140 @@
           </a:fontRef>
         </p:style>
       </p:cxnSp>
+      <p:sp>
+        <p:nvSpPr>
+          <p:cNvPr id="62" name="Cubo 61">
+            <a:extLst>
+              <a:ext uri="{FF2B5EF4-FFF2-40B4-BE49-F238E27FC236}">
+                <a16:creationId xmlns:a16="http://schemas.microsoft.com/office/drawing/2014/main" id="{265A539A-997C-41DD-9801-5CBB4D68745C}"/>
+              </a:ext>
+            </a:extLst>
+          </p:cNvPr>
+          <p:cNvSpPr/>
+          <p:nvPr/>
+        </p:nvSpPr>
+        <p:spPr>
+          <a:xfrm>
+            <a:off x="2678477" y="3415848"/>
+            <a:ext cx="500117" cy="445369"/>
+          </a:xfrm>
+          <a:prstGeom prst="cube">
+            <a:avLst>
+              <a:gd name="adj" fmla="val 16882"/>
+            </a:avLst>
+          </a:prstGeom>
+        </p:spPr>
+        <p:style>
+          <a:lnRef idx="1">
+            <a:schemeClr val="accent2"/>
+          </a:lnRef>
+          <a:fillRef idx="2">
+            <a:schemeClr val="accent2"/>
+          </a:fillRef>
+          <a:effectRef idx="1">
+            <a:schemeClr val="accent2"/>
+          </a:effectRef>
+          <a:fontRef idx="minor">
+            <a:schemeClr val="dk1"/>
+          </a:fontRef>
+        </p:style>
+        <p:txBody>
+          <a:bodyPr rtlCol="0" anchor="ctr"/>
+          <a:lstStyle/>
+          <a:p>
+            <a:pPr algn="ctr"/>
+            <a:r>
+              <a:rPr lang="pt-PT" sz="1400" dirty="0">
+                <a:ln w="0"/>
+                <a:solidFill>
+                  <a:schemeClr val="tx1"/>
+                </a:solidFill>
+                <a:effectLst>
+                  <a:outerShdw blurRad="38100" dist="19050" dir="2700000" algn="tl" rotWithShape="0">
+                    <a:schemeClr val="dk1">
+                      <a:alpha val="40000"/>
+                    </a:schemeClr>
+                  </a:outerShdw>
+                </a:effectLst>
+              </a:rPr>
+              <a:t>CV</a:t>
+            </a:r>
+          </a:p>
+        </p:txBody>
+      </p:sp>
+      <p:sp>
+        <p:nvSpPr>
+          <p:cNvPr id="64" name="Fluxograma: Decisão 63">
+            <a:extLst>
+              <a:ext uri="{FF2B5EF4-FFF2-40B4-BE49-F238E27FC236}">
+                <a16:creationId xmlns:a16="http://schemas.microsoft.com/office/drawing/2014/main" id="{70FE6F4A-78A4-48E3-8FB8-259073517387}"/>
+              </a:ext>
+            </a:extLst>
+          </p:cNvPr>
+          <p:cNvSpPr/>
+          <p:nvPr/>
+        </p:nvSpPr>
+        <p:spPr>
+          <a:xfrm>
+            <a:off x="2434359" y="4303475"/>
+            <a:ext cx="877532" cy="207473"/>
+          </a:xfrm>
+          <a:prstGeom prst="flowChartDecision">
+            <a:avLst/>
+          </a:prstGeom>
+          <a:ln/>
+        </p:spPr>
+        <p:style>
+          <a:lnRef idx="3">
+            <a:schemeClr val="lt1"/>
+          </a:lnRef>
+          <a:fillRef idx="1">
+            <a:schemeClr val="accent5"/>
+          </a:fillRef>
+          <a:effectRef idx="1">
+            <a:schemeClr val="accent5"/>
+          </a:effectRef>
+          <a:fontRef idx="minor">
+            <a:schemeClr val="lt1"/>
+          </a:fontRef>
+        </p:style>
+        <p:txBody>
+          <a:bodyPr rtlCol="0" anchor="ctr"/>
+          <a:lstStyle/>
+          <a:p>
+            <a:pPr algn="ctr"/>
+            <a:r>
+              <a:rPr lang="pt-PT" sz="1400" dirty="0">
+                <a:ln w="0"/>
+                <a:solidFill>
+                  <a:schemeClr val="tx1"/>
+                </a:solidFill>
+                <a:effectLst>
+                  <a:outerShdw blurRad="38100" dist="19050" dir="2700000" algn="tl" rotWithShape="0">
+                    <a:schemeClr val="dk1">
+                      <a:alpha val="40000"/>
+                    </a:schemeClr>
+                  </a:outerShdw>
+                </a:effectLst>
+              </a:rPr>
+              <a:t>MT</a:t>
+            </a:r>
+            <a:endParaRPr lang="pt-PT" sz="700" dirty="0">
+              <a:ln w="0"/>
+              <a:solidFill>
+                <a:schemeClr val="tx1"/>
+              </a:solidFill>
+              <a:effectLst>
+                <a:outerShdw blurRad="38100" dist="19050" dir="2700000" algn="tl" rotWithShape="0">
+                  <a:schemeClr val="dk1">
+                    <a:alpha val="40000"/>
+                  </a:schemeClr>
+                </a:outerShdw>
+              </a:effectLst>
+            </a:endParaRPr>
+          </a:p>
+        </p:txBody>
+      </p:sp>
     </p:spTree>
     <p:extLst>
       <p:ext uri="{BB962C8B-B14F-4D97-AF65-F5344CB8AC3E}">

</xml_diff>